<commit_message>
minor updates for review
</commit_message>
<xml_diff>
--- a/Inventory Management System midterm code review.pptx
+++ b/Inventory Management System midterm code review.pptx
@@ -108,6 +108,11 @@
       </a:defRPr>
     </a:lvl9pPr>
   </p:defaultTextStyle>
+  <p:extLst>
+    <p:ext uri="{EFAFB233-063F-42B5-8137-9DF3F51BA10A}">
+      <p15:sldGuideLst xmlns:p15="http://schemas.microsoft.com/office/powerpoint/2012/main"/>
+    </p:ext>
+  </p:extLst>
 </p:presentation>
 </file>
 
@@ -6338,8 +6343,27 @@
           <a:p>
             <a:r>
               <a:rPr lang="en-US" dirty="0"/>
-              <a:t>Major problems running current build on different computers, probably due to visual studio</a:t>
-            </a:r>
+              <a:t>Major problems running current build on different computers</a:t>
+            </a:r>
+          </a:p>
+          <a:p>
+            <a:r>
+              <a:rPr lang="en-US" dirty="0"/>
+              <a:t>Made as a website using ASP.net</a:t>
+            </a:r>
+          </a:p>
+          <a:p>
+            <a:r>
+              <a:rPr lang="en-US" dirty="0"/>
+              <a:t>Pages built out for login, inventory adding, account registration, viewing inventory and a </a:t>
+            </a:r>
+            <a:r>
+              <a:rPr lang="en-US"/>
+              <a:t>min menu </a:t>
+            </a:r>
+          </a:p>
+          <a:p>
+            <a:endParaRPr lang="en-US" dirty="0"/>
           </a:p>
           <a:p>
             <a:endParaRPr lang="en-US" dirty="0"/>
@@ -6716,8 +6740,13 @@
           <a:p>
             <a:r>
               <a:rPr lang="en-US" dirty="0"/>
-              <a:t>Candidate APIs found but do to problems running the interface have not been tested</a:t>
-            </a:r>
+              <a:t>Candidate APIs found but do to problems running the interface have not been </a:t>
+            </a:r>
+            <a:r>
+              <a:rPr lang="en-US"/>
+              <a:t>implamented</a:t>
+            </a:r>
+            <a:endParaRPr lang="en-US" dirty="0"/>
           </a:p>
         </p:txBody>
       </p:sp>

</xml_diff>